<commit_message>
updated literatur, sbw vortrag hinzugefügt
</commit_message>
<xml_diff>
--- a/Vortrag/Themenstellung.pptx
+++ b/Vortrag/Themenstellung.pptx
@@ -355,7 +355,7 @@
             <a:fld id="{3B1880FF-5A4E-4F25-9CEE-0D75F7C3E5E1}" type="datetimeFigureOut">
               <a:rPr lang="de-DE" smtClean="0"/>
               <a:pPr/>
-              <a:t>30.11.2022</a:t>
+              <a:t>10.05.2023</a:t>
             </a:fld>
             <a:endParaRPr lang="de-DE"/>
           </a:p>
@@ -455,7 +455,7 @@
             <a:fld id="{4D31F1D7-8377-4A76-8F5D-3E76EEE25737}" type="datetimeFigureOut">
               <a:rPr lang="de-DE" smtClean="0"/>
               <a:pPr/>
-              <a:t>30.11.2022</a:t>
+              <a:t>10.05.2023</a:t>
             </a:fld>
             <a:endParaRPr lang="de-DE"/>
           </a:p>
@@ -3143,7 +3143,7 @@
           <a:graphicData uri="http://schemas.openxmlformats.org/presentationml/2006/ole">
             <mc:AlternateContent xmlns:mc="http://schemas.openxmlformats.org/markup-compatibility/2006">
               <mc:Choice xmlns:v="urn:schemas-microsoft-com:vml" Requires="v">
-                <p:oleObj spid="_x0000_s1041" name="think-cell Folie" r:id="rId10" imgW="360" imgH="360" progId="">
+                <p:oleObj spid="_x0000_s1042" name="think-cell Folie" r:id="rId10" imgW="360" imgH="360" progId="">
                   <p:embed/>
                 </p:oleObj>
               </mc:Choice>
@@ -5057,8 +5057,9 @@
           <a:p>
             <a:r>
               <a:rPr lang="de-DE" dirty="0"/>
-              <a:t>Verteiltes Rechnen mittels autonomen Fahrzeugsteuergeräten</a:t>
-            </a:r>
+              <a:t>Verteiltes Rechnen mit Hilfe von autonomen Fahrzeugsteuergeräten</a:t>
+            </a:r>
+            <a:endParaRPr lang="de-DE" dirty="0"/>
           </a:p>
         </p:txBody>
       </p:sp>
@@ -11638,7 +11639,7 @@
           <a:graphicData uri="http://schemas.openxmlformats.org/presentationml/2006/ole">
             <mc:AlternateContent xmlns:mc="http://schemas.openxmlformats.org/markup-compatibility/2006">
               <mc:Choice xmlns:v="urn:schemas-microsoft-com:vml" Requires="v">
-                <p:oleObj spid="_x0000_s2065" name="think-cell Folie" r:id="rId4" imgW="360" imgH="360" progId="">
+                <p:oleObj spid="_x0000_s2066" name="think-cell Folie" r:id="rId4" imgW="360" imgH="360" progId="">
                   <p:embed/>
                 </p:oleObj>
               </mc:Choice>

</xml_diff>